<commit_message>
added some placeholder slides
</commit_message>
<xml_diff>
--- a/Dataset-update-hack-presentation.pptx
+++ b/Dataset-update-hack-presentation.pptx
@@ -8,6 +8,8 @@
     <p:sldId id="256" r:id="rId2"/>
     <p:sldId id="257" r:id="rId3"/>
     <p:sldId id="258" r:id="rId4"/>
+    <p:sldId id="259" r:id="rId5"/>
+    <p:sldId id="260" r:id="rId6"/>
   </p:sldIdLst>
   <p:sldSz cx="9144000" cy="6858000" type="screen4x3"/>
   <p:notesSz cx="6858000" cy="9144000"/>
@@ -3244,15 +3246,6 @@
                 <a:tailEnd/>
               </a14:hiddenLine>
             </a:ext>
-            <a:ext uri="{AF507438-7753-43E0-B8FC-AC1667EBCBE1}">
-              <a14:hiddenEffects xmlns:a14="http://schemas.microsoft.com/office/drawing/2010/main">
-                <a:effectLst>
-                  <a:outerShdw dist="35921" dir="2700000" algn="ctr" rotWithShape="0">
-                    <a:schemeClr val="bg2"/>
-                  </a:outerShdw>
-                </a:effectLst>
-              </a14:hiddenEffects>
-            </a:ext>
           </a:extLst>
         </p:spPr>
       </p:pic>
@@ -3438,15 +3431,6 @@
                 <a:tailEnd/>
               </a14:hiddenLine>
             </a:ext>
-            <a:ext uri="{AF507438-7753-43E0-B8FC-AC1667EBCBE1}">
-              <a14:hiddenEffects xmlns:a14="http://schemas.microsoft.com/office/drawing/2010/main">
-                <a:effectLst>
-                  <a:outerShdw dist="35921" dir="2700000" algn="ctr" rotWithShape="0">
-                    <a:schemeClr val="bg2"/>
-                  </a:outerShdw>
-                </a:effectLst>
-              </a14:hiddenEffects>
-            </a:ext>
           </a:extLst>
         </p:spPr>
       </p:pic>
@@ -3490,6 +3474,150 @@
     <p:extLst>
       <p:ext uri="{BB962C8B-B14F-4D97-AF65-F5344CB8AC3E}">
         <p14:creationId xmlns:p14="http://schemas.microsoft.com/office/powerpoint/2010/main" val="933850013"/>
+      </p:ext>
+    </p:extLst>
+  </p:cSld>
+  <p:clrMapOvr>
+    <a:masterClrMapping/>
+  </p:clrMapOvr>
+</p:sld>
+</file>
+
+<file path=ppt/slides/slide4.xml><?xml version="1.0" encoding="utf-8"?>
+<p:sld xmlns:a="http://schemas.openxmlformats.org/drawingml/2006/main" xmlns:r="http://schemas.openxmlformats.org/officeDocument/2006/relationships" xmlns:p="http://schemas.openxmlformats.org/presentationml/2006/main">
+  <p:cSld>
+    <p:spTree>
+      <p:nvGrpSpPr>
+        <p:cNvPr id="1" name=""/>
+        <p:cNvGrpSpPr/>
+        <p:nvPr/>
+      </p:nvGrpSpPr>
+      <p:grpSpPr>
+        <a:xfrm>
+          <a:off x="0" y="0"/>
+          <a:ext cx="0" cy="0"/>
+          <a:chOff x="0" y="0"/>
+          <a:chExt cx="0" cy="0"/>
+        </a:xfrm>
+      </p:grpSpPr>
+      <p:sp>
+        <p:nvSpPr>
+          <p:cNvPr id="2" name="Title 1"/>
+          <p:cNvSpPr>
+            <a:spLocks noGrp="1"/>
+          </p:cNvSpPr>
+          <p:nvPr>
+            <p:ph type="ctrTitle"/>
+          </p:nvPr>
+        </p:nvSpPr>
+        <p:spPr/>
+        <p:txBody>
+          <a:bodyPr/>
+          <a:lstStyle/>
+          <a:p>
+            <a:r>
+              <a:rPr lang="en-GB" dirty="0" smtClean="0"/>
+              <a:t>Why can’t we do this with data?</a:t>
+            </a:r>
+            <a:endParaRPr lang="en-GB" dirty="0"/>
+          </a:p>
+        </p:txBody>
+      </p:sp>
+      <p:sp>
+        <p:nvSpPr>
+          <p:cNvPr id="4" name="Subtitle 3"/>
+          <p:cNvSpPr>
+            <a:spLocks noGrp="1"/>
+          </p:cNvSpPr>
+          <p:nvPr>
+            <p:ph type="subTitle" idx="1"/>
+          </p:nvPr>
+        </p:nvSpPr>
+        <p:spPr/>
+        <p:txBody>
+          <a:bodyPr/>
+          <a:lstStyle/>
+          <a:p>
+            <a:endParaRPr lang="en-GB"/>
+          </a:p>
+        </p:txBody>
+      </p:sp>
+    </p:spTree>
+    <p:extLst>
+      <p:ext uri="{BB962C8B-B14F-4D97-AF65-F5344CB8AC3E}">
+        <p14:creationId xmlns:p14="http://schemas.microsoft.com/office/powerpoint/2010/main" val="3232560539"/>
+      </p:ext>
+    </p:extLst>
+  </p:cSld>
+  <p:clrMapOvr>
+    <a:masterClrMapping/>
+  </p:clrMapOvr>
+</p:sld>
+</file>
+
+<file path=ppt/slides/slide5.xml><?xml version="1.0" encoding="utf-8"?>
+<p:sld xmlns:a="http://schemas.openxmlformats.org/drawingml/2006/main" xmlns:r="http://schemas.openxmlformats.org/officeDocument/2006/relationships" xmlns:p="http://schemas.openxmlformats.org/presentationml/2006/main">
+  <p:cSld>
+    <p:spTree>
+      <p:nvGrpSpPr>
+        <p:cNvPr id="1" name=""/>
+        <p:cNvGrpSpPr/>
+        <p:nvPr/>
+      </p:nvGrpSpPr>
+      <p:grpSpPr>
+        <a:xfrm>
+          <a:off x="0" y="0"/>
+          <a:ext cx="0" cy="0"/>
+          <a:chOff x="0" y="0"/>
+          <a:chExt cx="0" cy="0"/>
+        </a:xfrm>
+      </p:grpSpPr>
+      <p:sp>
+        <p:nvSpPr>
+          <p:cNvPr id="2" name="Title 1"/>
+          <p:cNvSpPr>
+            <a:spLocks noGrp="1"/>
+          </p:cNvSpPr>
+          <p:nvPr>
+            <p:ph type="title"/>
+          </p:nvPr>
+        </p:nvSpPr>
+        <p:spPr/>
+        <p:txBody>
+          <a:bodyPr/>
+          <a:lstStyle/>
+          <a:p>
+            <a:r>
+              <a:rPr lang="en-GB" smtClean="0"/>
+              <a:t>Introducing D’OI</a:t>
+            </a:r>
+            <a:endParaRPr lang="en-GB" dirty="0"/>
+          </a:p>
+        </p:txBody>
+      </p:sp>
+      <p:sp>
+        <p:nvSpPr>
+          <p:cNvPr id="3" name="Content Placeholder 2"/>
+          <p:cNvSpPr>
+            <a:spLocks noGrp="1"/>
+          </p:cNvSpPr>
+          <p:nvPr>
+            <p:ph idx="1"/>
+          </p:nvPr>
+        </p:nvSpPr>
+        <p:spPr/>
+        <p:txBody>
+          <a:bodyPr/>
+          <a:lstStyle/>
+          <a:p>
+            <a:endParaRPr lang="en-GB"/>
+          </a:p>
+        </p:txBody>
+      </p:sp>
+    </p:spTree>
+    <p:extLst>
+      <p:ext uri="{BB962C8B-B14F-4D97-AF65-F5344CB8AC3E}">
+        <p14:creationId xmlns:p14="http://schemas.microsoft.com/office/powerpoint/2010/main" val="3914627351"/>
       </p:ext>
     </p:extLst>
   </p:cSld>

</xml_diff>

<commit_message>
Added the D'OI logo to the presentation
</commit_message>
<xml_diff>
--- a/Dataset-update-hack-presentation.pptx
+++ b/Dataset-update-hack-presentation.pptx
@@ -3588,32 +3588,70 @@
           <a:lstStyle/>
           <a:p>
             <a:r>
-              <a:rPr lang="en-GB" smtClean="0"/>
-              <a:t>Introducing D’OI</a:t>
+              <a:rPr lang="en-GB" dirty="0" smtClean="0"/>
+              <a:t>Introducing </a:t>
+            </a:r>
+            <a:r>
+              <a:rPr lang="en-GB" dirty="0" smtClean="0"/>
+              <a:t>D’OI for data</a:t>
             </a:r>
             <a:endParaRPr lang="en-GB" dirty="0"/>
           </a:p>
         </p:txBody>
       </p:sp>
-      <p:sp>
-        <p:nvSpPr>
-          <p:cNvPr id="3" name="Content Placeholder 2"/>
-          <p:cNvSpPr>
-            <a:spLocks noGrp="1"/>
-          </p:cNvSpPr>
-          <p:nvPr>
-            <p:ph idx="1"/>
-          </p:nvPr>
-        </p:nvSpPr>
-        <p:spPr/>
-        <p:txBody>
-          <a:bodyPr/>
-          <a:lstStyle/>
-          <a:p>
-            <a:endParaRPr lang="en-GB"/>
-          </a:p>
-        </p:txBody>
-      </p:sp>
+      <p:pic>
+        <p:nvPicPr>
+          <p:cNvPr id="1026" name="Picture 2" descr="https://files.gitter.im/ScientificDataLabs/dataset-updates-plugin/lxUg/d_oi.png"/>
+          <p:cNvPicPr>
+            <a:picLocks noChangeAspect="1" noChangeArrowheads="1"/>
+          </p:cNvPicPr>
+          <p:nvPr/>
+        </p:nvPicPr>
+        <p:blipFill>
+          <a:blip r:embed="rId2">
+            <a:extLst>
+              <a:ext uri="{28A0092B-C50C-407E-A947-70E740481C1C}">
+                <a14:useLocalDpi xmlns:a14="http://schemas.microsoft.com/office/drawing/2010/main" val="0"/>
+              </a:ext>
+            </a:extLst>
+          </a:blip>
+          <a:srcRect/>
+          <a:stretch>
+            <a:fillRect/>
+          </a:stretch>
+        </p:blipFill>
+        <p:spPr bwMode="auto">
+          <a:xfrm>
+            <a:off x="2771800" y="1556792"/>
+            <a:ext cx="3456384" cy="3456384"/>
+          </a:xfrm>
+          <a:prstGeom prst="roundRect">
+            <a:avLst>
+              <a:gd name="adj" fmla="val 8594"/>
+            </a:avLst>
+          </a:prstGeom>
+          <a:solidFill>
+            <a:srgbClr val="FFFFFF">
+              <a:shade val="85000"/>
+            </a:srgbClr>
+          </a:solidFill>
+          <a:ln>
+            <a:noFill/>
+          </a:ln>
+          <a:effectLst>
+            <a:reflection blurRad="12700" stA="38000" endPos="28000" dist="5000" dir="5400000" sy="-100000" algn="bl" rotWithShape="0"/>
+          </a:effectLst>
+          <a:extLst>
+            <a:ext uri="{909E8E84-426E-40DD-AFC4-6F175D3DCCD1}">
+              <a14:hiddenFill xmlns:a14="http://schemas.microsoft.com/office/drawing/2010/main">
+                <a:solidFill>
+                  <a:srgbClr val="FFFFFF"/>
+                </a:solidFill>
+              </a14:hiddenFill>
+            </a:ext>
+          </a:extLst>
+        </p:spPr>
+      </p:pic>
     </p:spTree>
     <p:extLst>
       <p:ext uri="{BB962C8B-B14F-4D97-AF65-F5344CB8AC3E}">

</xml_diff>